<commit_message>
powerpoint -> add link github wiki
</commit_message>
<xml_diff>
--- a/Présentation P6 - OpenClassrooms.pptx
+++ b/Présentation P6 - OpenClassrooms.pptx
@@ -16371,6 +16371,25 @@
               <a:t>Customisation du jeu</a:t>
             </a:r>
           </a:p>
+          <a:p>
+            <a:endParaRPr lang="fr-FR" dirty="0"/>
+          </a:p>
+          <a:p>
+            <a:r>
+              <a:rPr lang="fr-FR" dirty="0"/>
+              <a:t>Pour plus d’informations sur le projet, </a:t>
+            </a:r>
+            <a:r>
+              <a:rPr lang="fr-FR" dirty="0">
+                <a:hlinkClick r:id="rId4"/>
+              </a:rPr>
+              <a:t>consultez le wiki</a:t>
+            </a:r>
+            <a:r>
+              <a:rPr lang="fr-FR" dirty="0"/>
+              <a:t> sur GitHub</a:t>
+            </a:r>
+          </a:p>
         </p:txBody>
       </p:sp>
     </p:spTree>

</xml_diff>